<commit_message>
[presentation] made slides retrospective, results&challenges
</commit_message>
<xml_diff>
--- a/docs/presentation/Presentasjon oblig4.pptx
+++ b/docs/presentation/Presentasjon oblig4.pptx
@@ -8611,7 +8611,7 @@
                 </a:solidFill>
                 <a:latin typeface="Rockwell" pitchFamily="18" charset="0"/>
               </a:rPr>
-              <a:t>RESULTATER &amp;</a:t>
+              <a:t>RESULTS &amp;</a:t>
             </a:r>
             <a:endParaRPr lang="es-HN" sz="4930" b="1" dirty="0">
               <a:solidFill>
@@ -8766,7 +8766,7 @@
                 </a:solidFill>
                 <a:latin typeface="Rockwell" pitchFamily="18" charset="0"/>
               </a:rPr>
-              <a:t>UTFORDRINGER</a:t>
+              <a:t>CHALLENGES</a:t>
             </a:r>
           </a:p>
         </p:txBody>
@@ -9582,6 +9582,228 @@
               <a:buChar char=""/>
             </a:pPr>
             <a:endParaRPr lang="en-US" sz="1800" b="0" strike="noStrike" spc="-1" dirty="0">
+              <a:solidFill>
+                <a:srgbClr val="000000"/>
+              </a:solidFill>
+              <a:uFill>
+                <a:solidFill>
+                  <a:srgbClr val="FFFFFF"/>
+                </a:solidFill>
+              </a:uFill>
+              <a:latin typeface="Arial"/>
+            </a:endParaRPr>
+          </a:p>
+        </p:txBody>
+      </p:sp>
+      <p:sp>
+        <p:nvSpPr>
+          <p:cNvPr id="22" name="CustomShape 6">
+            <a:extLst>
+              <a:ext uri="{FF2B5EF4-FFF2-40B4-BE49-F238E27FC236}">
+                <a16:creationId xmlns:a16="http://schemas.microsoft.com/office/drawing/2014/main" id="{58309304-4AF7-445F-BCF0-EAC7BCF03BC6}"/>
+              </a:ext>
+            </a:extLst>
+          </p:cNvPr>
+          <p:cNvSpPr/>
+          <p:nvPr/>
+        </p:nvSpPr>
+        <p:spPr>
+          <a:xfrm>
+            <a:off x="698658" y="2534422"/>
+            <a:ext cx="8143560" cy="2238840"/>
+          </a:xfrm>
+          <a:prstGeom prst="rect">
+            <a:avLst/>
+          </a:prstGeom>
+          <a:noFill/>
+          <a:ln>
+            <a:noFill/>
+          </a:ln>
+        </p:spPr>
+        <p:style>
+          <a:lnRef idx="0">
+            <a:scrgbClr r="0" g="0" b="0"/>
+          </a:lnRef>
+          <a:fillRef idx="0">
+            <a:scrgbClr r="0" g="0" b="0"/>
+          </a:fillRef>
+          <a:effectRef idx="0">
+            <a:scrgbClr r="0" g="0" b="0"/>
+          </a:effectRef>
+          <a:fontRef idx="minor"/>
+        </p:style>
+        <p:txBody>
+          <a:bodyPr lIns="0" tIns="0" rIns="0" bIns="0"/>
+          <a:lstStyle/>
+          <a:p>
+            <a:pPr marL="216000" indent="-216000" algn="just">
+              <a:lnSpc>
+                <a:spcPct val="100000"/>
+              </a:lnSpc>
+              <a:buClr>
+                <a:srgbClr val="808080"/>
+              </a:buClr>
+              <a:buSzPct val="45000"/>
+              <a:buFont typeface="Wingdings" charset="2"/>
+              <a:buChar char=""/>
+            </a:pPr>
+            <a:r>
+              <a:rPr lang="en-US" spc="-1" dirty="0">
+                <a:solidFill>
+                  <a:srgbClr val="808080"/>
+                </a:solidFill>
+                <a:uFill>
+                  <a:solidFill>
+                    <a:srgbClr val="FFFFFF"/>
+                  </a:solidFill>
+                </a:uFill>
+                <a:latin typeface="Calibri"/>
+              </a:rPr>
+              <a:t>From Maven to Gradle</a:t>
+            </a:r>
+          </a:p>
+          <a:p>
+            <a:pPr marL="216000" indent="-216000" algn="just">
+              <a:lnSpc>
+                <a:spcPct val="100000"/>
+              </a:lnSpc>
+              <a:buClr>
+                <a:srgbClr val="808080"/>
+              </a:buClr>
+              <a:buSzPct val="45000"/>
+              <a:buFont typeface="Wingdings" charset="2"/>
+              <a:buChar char=""/>
+            </a:pPr>
+            <a:r>
+              <a:rPr lang="en-US" spc="-1" dirty="0">
+                <a:solidFill>
+                  <a:srgbClr val="808080"/>
+                </a:solidFill>
+                <a:uFill>
+                  <a:solidFill>
+                    <a:srgbClr val="FFFFFF"/>
+                  </a:solidFill>
+                </a:uFill>
+                <a:latin typeface="Calibri"/>
+              </a:rPr>
+              <a:t>Improved use of issues</a:t>
+            </a:r>
+          </a:p>
+          <a:p>
+            <a:pPr marL="216000" indent="-216000" algn="just">
+              <a:lnSpc>
+                <a:spcPct val="100000"/>
+              </a:lnSpc>
+              <a:buClr>
+                <a:srgbClr val="808080"/>
+              </a:buClr>
+              <a:buSzPct val="45000"/>
+              <a:buFont typeface="Wingdings" charset="2"/>
+              <a:buChar char=""/>
+            </a:pPr>
+            <a:endParaRPr lang="en-US" spc="-1" dirty="0">
+              <a:solidFill>
+                <a:srgbClr val="808080"/>
+              </a:solidFill>
+              <a:uFill>
+                <a:solidFill>
+                  <a:srgbClr val="FFFFFF"/>
+                </a:solidFill>
+              </a:uFill>
+              <a:latin typeface="Calibri"/>
+            </a:endParaRPr>
+          </a:p>
+          <a:p>
+            <a:pPr marL="216000" indent="-216000" algn="just">
+              <a:lnSpc>
+                <a:spcPct val="100000"/>
+              </a:lnSpc>
+              <a:buClr>
+                <a:srgbClr val="808080"/>
+              </a:buClr>
+              <a:buSzPct val="45000"/>
+              <a:buFont typeface="Wingdings" charset="2"/>
+              <a:buChar char=""/>
+            </a:pPr>
+            <a:endParaRPr lang="en-US" spc="-1" dirty="0">
+              <a:solidFill>
+                <a:srgbClr val="808080"/>
+              </a:solidFill>
+              <a:uFill>
+                <a:solidFill>
+                  <a:srgbClr val="FFFFFF"/>
+                </a:solidFill>
+              </a:uFill>
+              <a:latin typeface="Calibri"/>
+            </a:endParaRPr>
+          </a:p>
+          <a:p>
+            <a:pPr marL="216000" indent="-216000" algn="just">
+              <a:lnSpc>
+                <a:spcPct val="100000"/>
+              </a:lnSpc>
+              <a:buClr>
+                <a:srgbClr val="808080"/>
+              </a:buClr>
+              <a:buSzPct val="45000"/>
+              <a:buFont typeface="Wingdings" charset="2"/>
+              <a:buChar char=""/>
+            </a:pPr>
+            <a:r>
+              <a:rPr lang="en-US" spc="-1" dirty="0">
+                <a:solidFill>
+                  <a:srgbClr val="808080"/>
+                </a:solidFill>
+                <a:uFill>
+                  <a:solidFill>
+                    <a:srgbClr val="FFFFFF"/>
+                  </a:solidFill>
+                </a:uFill>
+                <a:latin typeface="Calibri"/>
+              </a:rPr>
+              <a:t>UI competence</a:t>
+            </a:r>
+          </a:p>
+          <a:p>
+            <a:pPr marL="216000" indent="-216000" algn="just">
+              <a:lnSpc>
+                <a:spcPct val="100000"/>
+              </a:lnSpc>
+              <a:buClr>
+                <a:srgbClr val="808080"/>
+              </a:buClr>
+              <a:buSzPct val="45000"/>
+              <a:buFont typeface="Wingdings" charset="2"/>
+              <a:buChar char=""/>
+            </a:pPr>
+            <a:r>
+              <a:rPr lang="en-US" spc="-1" dirty="0">
+                <a:solidFill>
+                  <a:srgbClr val="808080"/>
+                </a:solidFill>
+                <a:uFill>
+                  <a:solidFill>
+                    <a:srgbClr val="FFFFFF"/>
+                  </a:solidFill>
+                </a:uFill>
+                <a:latin typeface="Calibri"/>
+              </a:rPr>
+              <a:t>Role entrenchment</a:t>
+            </a:r>
+          </a:p>
+          <a:p>
+            <a:pPr marL="216000" indent="-216000" algn="just">
+              <a:lnSpc>
+                <a:spcPct val="100000"/>
+              </a:lnSpc>
+              <a:buClr>
+                <a:srgbClr val="808080"/>
+              </a:buClr>
+              <a:buSzPct val="45000"/>
+              <a:buFont typeface="Wingdings" charset="2"/>
+              <a:buChar char=""/>
+            </a:pPr>
+            <a:endParaRPr lang="en-US" sz="2400" b="0" strike="noStrike" spc="-1" dirty="0">
               <a:solidFill>
                 <a:srgbClr val="000000"/>
               </a:solidFill>
@@ -9939,6 +10161,41 @@
                                         <p:cTn id="26" dur="2000"/>
                                         <p:tgtEl>
                                           <p:spTgt spid="21"/>
+                                        </p:tgtEl>
+                                      </p:cBhvr>
+                                    </p:animEffect>
+                                  </p:childTnLst>
+                                </p:cTn>
+                              </p:par>
+                              <p:par>
+                                <p:cTn id="27" presetID="10" presetClass="entr" fill="hold" nodeType="withEffect">
+                                  <p:stCondLst>
+                                    <p:cond delay="0"/>
+                                  </p:stCondLst>
+                                  <p:childTnLst>
+                                    <p:set>
+                                      <p:cBhvr>
+                                        <p:cTn id="28" dur="1" fill="hold">
+                                          <p:stCondLst>
+                                            <p:cond delay="0"/>
+                                          </p:stCondLst>
+                                        </p:cTn>
+                                        <p:tgtEl>
+                                          <p:spTgt spid="22"/>
+                                        </p:tgtEl>
+                                        <p:attrNameLst>
+                                          <p:attrName>style.visibility</p:attrName>
+                                        </p:attrNameLst>
+                                      </p:cBhvr>
+                                      <p:to>
+                                        <p:strVal val="visible"/>
+                                      </p:to>
+                                    </p:set>
+                                    <p:animEffect transition="in" filter="fade">
+                                      <p:cBhvr additive="repl">
+                                        <p:cTn id="29" dur="2000"/>
+                                        <p:tgtEl>
+                                          <p:spTgt spid="22"/>
                                         </p:tgtEl>
                                       </p:cBhvr>
                                     </p:animEffect>
@@ -14146,7 +14403,7 @@
               <a:defRPr/>
             </a:pPr>
             <a:r>
-              <a:rPr kumimoji="0" lang="en-US" sz="3600" b="1" i="0" u="none" strike="noStrike" kern="1200" cap="none" spc="-1" normalizeH="0" baseline="0" noProof="0">
+              <a:rPr kumimoji="0" lang="en-US" sz="3600" b="1" i="0" u="none" strike="noStrike" kern="1200" cap="none" spc="-1" normalizeH="0" baseline="0" noProof="0" dirty="0">
                 <a:ln>
                   <a:noFill/>
                 </a:ln>
@@ -14162,9 +14419,9 @@
                 </a:uFill>
                 <a:latin typeface="Rockwell"/>
               </a:rPr>
-              <a:t>SUMMARY</a:t>
+              <a:t>Next Iteration</a:t>
             </a:r>
-            <a:endParaRPr kumimoji="0" lang="en-US" sz="1800" b="0" i="0" u="none" strike="noStrike" kern="1200" cap="none" spc="-1" normalizeH="0" baseline="0" noProof="0">
+            <a:endParaRPr kumimoji="0" lang="en-US" sz="1800" b="0" i="0" u="none" strike="noStrike" kern="1200" cap="none" spc="-1" normalizeH="0" baseline="0" noProof="0" dirty="0">
               <a:ln>
                 <a:noFill/>
               </a:ln>
@@ -14235,26 +14492,7 @@
               <a:tabLst/>
               <a:defRPr/>
             </a:pPr>
-            <a:r>
-              <a:rPr kumimoji="0" lang="en-US" sz="1600" b="1" i="0" u="none" strike="noStrike" kern="1200" cap="none" spc="-1" normalizeH="0" baseline="0" noProof="0">
-                <a:ln>
-                  <a:noFill/>
-                </a:ln>
-                <a:solidFill>
-                  <a:srgbClr val="404040"/>
-                </a:solidFill>
-                <a:effectLst/>
-                <a:uLnTx/>
-                <a:uFill>
-                  <a:solidFill>
-                    <a:srgbClr val="FFFFFF"/>
-                  </a:solidFill>
-                </a:uFill>
-                <a:latin typeface="Rockwell"/>
-              </a:rPr>
-              <a:t>Results of this project</a:t>
-            </a:r>
-            <a:endParaRPr kumimoji="0" lang="en-US" sz="1800" b="0" i="0" u="none" strike="noStrike" kern="1200" cap="none" spc="-1" normalizeH="0" baseline="0" noProof="0">
+            <a:endParaRPr kumimoji="0" lang="en-US" sz="1800" b="0" i="0" u="none" strike="noStrike" kern="1200" cap="none" spc="-1" normalizeH="0" baseline="0" noProof="0" dirty="0">
               <a:ln>
                 <a:noFill/>
               </a:ln>
@@ -14781,15 +15019,10 @@
               <a:defRPr/>
             </a:pPr>
             <a:r>
-              <a:rPr kumimoji="0" lang="en-US" sz="1200" b="0" i="0" u="none" strike="noStrike" kern="1200" cap="none" spc="-1" normalizeH="0" baseline="0" noProof="0" dirty="0">
-                <a:ln>
-                  <a:noFill/>
-                </a:ln>
+              <a:rPr lang="en-US" sz="1200" spc="-1" noProof="0" dirty="0">
                 <a:solidFill>
                   <a:srgbClr val="808080"/>
                 </a:solidFill>
-                <a:effectLst/>
-                <a:uLnTx/>
                 <a:uFill>
                   <a:solidFill>
                     <a:srgbClr val="FFFFFF"/>
@@ -14797,24 +15030,8 @@
                 </a:uFill>
                 <a:latin typeface="Calibri"/>
               </a:rPr>
-              <a:t>Meeting/communication organization</a:t>
+              <a:t>Get better at the tools we are using</a:t>
             </a:r>
-            <a:endParaRPr kumimoji="0" lang="en-US" sz="1800" b="0" i="0" u="none" strike="noStrike" kern="1200" cap="none" spc="-1" normalizeH="0" baseline="0" noProof="0" dirty="0">
-              <a:ln>
-                <a:noFill/>
-              </a:ln>
-              <a:solidFill>
-                <a:srgbClr val="000000"/>
-              </a:solidFill>
-              <a:effectLst/>
-              <a:uLnTx/>
-              <a:uFill>
-                <a:solidFill>
-                  <a:srgbClr val="FFFFFF"/>
-                </a:solidFill>
-              </a:uFill>
-              <a:latin typeface="Arial"/>
-            </a:endParaRPr>
           </a:p>
           <a:p>
             <a:pPr marL="216000" marR="0" lvl="0" indent="-216000" algn="just" defTabSz="914400" rtl="0" eaLnBrk="1" fontAlgn="auto" latinLnBrk="0" hangingPunct="1">
@@ -14837,7 +15054,7 @@
               <a:defRPr/>
             </a:pPr>
             <a:r>
-              <a:rPr kumimoji="0" lang="en-US" sz="1200" b="0" i="0" u="none" strike="noStrike" kern="1200" cap="none" spc="-1" normalizeH="0" baseline="0" noProof="0" dirty="0">
+              <a:rPr kumimoji="0" lang="en-US" sz="1200" b="0" i="0" u="none" strike="noStrike" kern="1200" cap="none" spc="-1" normalizeH="0" baseline="0" dirty="0">
                 <a:ln>
                   <a:noFill/>
                 </a:ln>
@@ -14853,47 +15070,10 @@
                 </a:uFill>
                 <a:latin typeface="Calibri"/>
               </a:rPr>
-              <a:t>Role distribution</a:t>
+              <a:t>Shift away from role-based</a:t>
             </a:r>
-            <a:endParaRPr kumimoji="0" lang="en-US" sz="1800" b="0" i="0" u="none" strike="noStrike" kern="1200" cap="none" spc="-1" normalizeH="0" baseline="0" noProof="0" dirty="0">
-              <a:ln>
-                <a:noFill/>
-              </a:ln>
-              <a:solidFill>
-                <a:srgbClr val="000000"/>
-              </a:solidFill>
-              <a:effectLst/>
-              <a:uLnTx/>
-              <a:uFill>
-                <a:solidFill>
-                  <a:srgbClr val="FFFFFF"/>
-                </a:solidFill>
-              </a:uFill>
-              <a:latin typeface="Arial"/>
-            </a:endParaRPr>
-          </a:p>
-          <a:p>
-            <a:pPr marL="216000" marR="0" lvl="0" indent="-216000" algn="just" defTabSz="914400" rtl="0" eaLnBrk="1" fontAlgn="auto" latinLnBrk="0" hangingPunct="1">
-              <a:lnSpc>
-                <a:spcPct val="120000"/>
-              </a:lnSpc>
-              <a:spcBef>
-                <a:spcPts val="0"/>
-              </a:spcBef>
-              <a:spcAft>
-                <a:spcPts val="0"/>
-              </a:spcAft>
-              <a:buClr>
-                <a:srgbClr val="808080"/>
-              </a:buClr>
-              <a:buSzPct val="45000"/>
-              <a:buFont typeface="Wingdings" charset="2"/>
-              <a:buChar char=""/>
-              <a:tabLst/>
-              <a:defRPr/>
-            </a:pPr>
             <a:r>
-              <a:rPr kumimoji="0" lang="en-US" sz="1200" b="0" i="0" u="none" strike="noStrike" kern="1200" cap="none" spc="-1" normalizeH="0" baseline="0" noProof="0" dirty="0">
+              <a:rPr kumimoji="0" lang="en-US" sz="1200" b="0" i="0" u="none" strike="noStrike" kern="1200" cap="none" spc="-1" normalizeH="0" dirty="0">
                 <a:ln>
                   <a:noFill/>
                 </a:ln>
@@ -14909,119 +15089,7 @@
                 </a:uFill>
                 <a:latin typeface="Calibri"/>
               </a:rPr>
-              <a:t>Tools for later iterations chosen</a:t>
-            </a:r>
-            <a:endParaRPr kumimoji="0" lang="en-US" sz="1800" b="0" i="0" u="none" strike="noStrike" kern="1200" cap="none" spc="-1" normalizeH="0" baseline="0" noProof="0" dirty="0">
-              <a:ln>
-                <a:noFill/>
-              </a:ln>
-              <a:solidFill>
-                <a:srgbClr val="000000"/>
-              </a:solidFill>
-              <a:effectLst/>
-              <a:uLnTx/>
-              <a:uFill>
-                <a:solidFill>
-                  <a:srgbClr val="FFFFFF"/>
-                </a:solidFill>
-              </a:uFill>
-              <a:latin typeface="Arial"/>
-            </a:endParaRPr>
-          </a:p>
-          <a:p>
-            <a:pPr marL="216000" marR="0" lvl="0" indent="-216000" algn="just" defTabSz="914400" rtl="0" eaLnBrk="1" fontAlgn="auto" latinLnBrk="0" hangingPunct="1">
-              <a:lnSpc>
-                <a:spcPct val="120000"/>
-              </a:lnSpc>
-              <a:spcBef>
-                <a:spcPts val="0"/>
-              </a:spcBef>
-              <a:spcAft>
-                <a:spcPts val="0"/>
-              </a:spcAft>
-              <a:buClr>
-                <a:srgbClr val="808080"/>
-              </a:buClr>
-              <a:buSzPct val="45000"/>
-              <a:buFont typeface="Wingdings" charset="2"/>
-              <a:buChar char=""/>
-              <a:tabLst/>
-              <a:defRPr/>
-            </a:pPr>
-            <a:r>
-              <a:rPr kumimoji="0" lang="en-US" sz="1200" b="0" i="0" u="none" strike="noStrike" kern="1200" cap="none" spc="-1" normalizeH="0" baseline="0" noProof="0" dirty="0">
-                <a:ln>
-                  <a:noFill/>
-                </a:ln>
-                <a:solidFill>
-                  <a:srgbClr val="808080"/>
-                </a:solidFill>
-                <a:effectLst/>
-                <a:uLnTx/>
-                <a:uFill>
-                  <a:solidFill>
-                    <a:srgbClr val="FFFFFF"/>
-                  </a:solidFill>
-                </a:uFill>
-                <a:latin typeface="Calibri"/>
-              </a:rPr>
-              <a:t>General project plan</a:t>
-            </a:r>
-            <a:endParaRPr kumimoji="0" lang="en-US" sz="1800" b="0" i="0" u="none" strike="noStrike" kern="1200" cap="none" spc="-1" normalizeH="0" baseline="0" noProof="0" dirty="0">
-              <a:ln>
-                <a:noFill/>
-              </a:ln>
-              <a:solidFill>
-                <a:srgbClr val="000000"/>
-              </a:solidFill>
-              <a:effectLst/>
-              <a:uLnTx/>
-              <a:uFill>
-                <a:solidFill>
-                  <a:srgbClr val="FFFFFF"/>
-                </a:solidFill>
-              </a:uFill>
-              <a:latin typeface="Arial"/>
-            </a:endParaRPr>
-          </a:p>
-          <a:p>
-            <a:pPr marL="216000" marR="0" lvl="0" indent="-216000" algn="just" defTabSz="914400" rtl="0" eaLnBrk="1" fontAlgn="auto" latinLnBrk="0" hangingPunct="1">
-              <a:lnSpc>
-                <a:spcPct val="120000"/>
-              </a:lnSpc>
-              <a:spcBef>
-                <a:spcPts val="0"/>
-              </a:spcBef>
-              <a:spcAft>
-                <a:spcPts val="0"/>
-              </a:spcAft>
-              <a:buClr>
-                <a:srgbClr val="808080"/>
-              </a:buClr>
-              <a:buSzPct val="45000"/>
-              <a:buFont typeface="Wingdings" charset="2"/>
-              <a:buChar char=""/>
-              <a:tabLst/>
-              <a:defRPr/>
-            </a:pPr>
-            <a:r>
-              <a:rPr kumimoji="0" lang="en-US" sz="1200" b="0" i="0" u="none" strike="noStrike" kern="1200" cap="none" spc="-1" normalizeH="0" baseline="0" noProof="0" dirty="0">
-                <a:ln>
-                  <a:noFill/>
-                </a:ln>
-                <a:solidFill>
-                  <a:srgbClr val="808080"/>
-                </a:solidFill>
-                <a:effectLst/>
-                <a:uLnTx/>
-                <a:uFill>
-                  <a:solidFill>
-                    <a:srgbClr val="FFFFFF"/>
-                  </a:solidFill>
-                </a:uFill>
-                <a:latin typeface="Calibri"/>
-              </a:rPr>
-              <a:t>Deliverables</a:t>
+              <a:t> system</a:t>
             </a:r>
             <a:endParaRPr kumimoji="0" lang="en-US" sz="1800" b="0" i="0" u="none" strike="noStrike" kern="1200" cap="none" spc="-1" normalizeH="0" baseline="0" noProof="0" dirty="0">
               <a:ln>
@@ -15065,651 +15133,6 @@
           </a:ln>
         </p:spPr>
       </p:pic>
-      <p:sp>
-        <p:nvSpPr>
-          <p:cNvPr id="300" name="CustomShape 10"/>
-          <p:cNvSpPr/>
-          <p:nvPr/>
-        </p:nvSpPr>
-        <p:spPr>
-          <a:xfrm>
-            <a:off x="484200" y="3292920"/>
-            <a:ext cx="4519080" cy="474480"/>
-          </a:xfrm>
-          <a:prstGeom prst="rect">
-            <a:avLst/>
-          </a:prstGeom>
-          <a:noFill/>
-          <a:ln>
-            <a:noFill/>
-          </a:ln>
-        </p:spPr>
-        <p:style>
-          <a:lnRef idx="0">
-            <a:scrgbClr r="0" g="0" b="0"/>
-          </a:lnRef>
-          <a:fillRef idx="0">
-            <a:scrgbClr r="0" g="0" b="0"/>
-          </a:fillRef>
-          <a:effectRef idx="0">
-            <a:scrgbClr r="0" g="0" b="0"/>
-          </a:effectRef>
-          <a:fontRef idx="minor"/>
-        </p:style>
-        <p:txBody>
-          <a:bodyPr lIns="90000" tIns="45000" rIns="90000" bIns="45000" anchor="ctr"/>
-          <a:lstStyle/>
-          <a:p>
-            <a:pPr marL="0" marR="0" lvl="0" indent="0" algn="l" defTabSz="914400" rtl="0" eaLnBrk="1" fontAlgn="auto" latinLnBrk="0" hangingPunct="1">
-              <a:lnSpc>
-                <a:spcPts val="2032"/>
-              </a:lnSpc>
-              <a:spcBef>
-                <a:spcPts val="0"/>
-              </a:spcBef>
-              <a:spcAft>
-                <a:spcPts val="0"/>
-              </a:spcAft>
-              <a:buClrTx/>
-              <a:buSzTx/>
-              <a:buFontTx/>
-              <a:buNone/>
-              <a:tabLst/>
-              <a:defRPr/>
-            </a:pPr>
-            <a:r>
-              <a:rPr kumimoji="0" lang="en-US" sz="1600" b="1" i="0" u="none" strike="noStrike" kern="1200" cap="none" spc="-1" normalizeH="0" baseline="0" noProof="0">
-                <a:ln>
-                  <a:noFill/>
-                </a:ln>
-                <a:solidFill>
-                  <a:srgbClr val="404040"/>
-                </a:solidFill>
-                <a:effectLst/>
-                <a:uLnTx/>
-                <a:uFill>
-                  <a:solidFill>
-                    <a:srgbClr val="FFFFFF"/>
-                  </a:solidFill>
-                </a:uFill>
-                <a:latin typeface="Rockwell"/>
-              </a:rPr>
-              <a:t>In retrospect...</a:t>
-            </a:r>
-            <a:endParaRPr kumimoji="0" lang="en-US" sz="1800" b="0" i="0" u="none" strike="noStrike" kern="1200" cap="none" spc="-1" normalizeH="0" baseline="0" noProof="0">
-              <a:ln>
-                <a:noFill/>
-              </a:ln>
-              <a:solidFill>
-                <a:srgbClr val="000000"/>
-              </a:solidFill>
-              <a:effectLst/>
-              <a:uLnTx/>
-              <a:uFill>
-                <a:solidFill>
-                  <a:srgbClr val="FFFFFF"/>
-                </a:solidFill>
-              </a:uFill>
-              <a:latin typeface="Arial"/>
-            </a:endParaRPr>
-          </a:p>
-        </p:txBody>
-      </p:sp>
-      <p:sp>
-        <p:nvSpPr>
-          <p:cNvPr id="301" name="CustomShape 11"/>
-          <p:cNvSpPr/>
-          <p:nvPr/>
-        </p:nvSpPr>
-        <p:spPr>
-          <a:xfrm>
-            <a:off x="477720" y="3974040"/>
-            <a:ext cx="3553920" cy="1512360"/>
-          </a:xfrm>
-          <a:prstGeom prst="rect">
-            <a:avLst/>
-          </a:prstGeom>
-          <a:noFill/>
-          <a:ln>
-            <a:noFill/>
-          </a:ln>
-        </p:spPr>
-        <p:style>
-          <a:lnRef idx="0">
-            <a:scrgbClr r="0" g="0" b="0"/>
-          </a:lnRef>
-          <a:fillRef idx="0">
-            <a:scrgbClr r="0" g="0" b="0"/>
-          </a:fillRef>
-          <a:effectRef idx="0">
-            <a:scrgbClr r="0" g="0" b="0"/>
-          </a:effectRef>
-          <a:fontRef idx="minor"/>
-        </p:style>
-        <p:txBody>
-          <a:bodyPr lIns="90000" tIns="45000" rIns="90000" bIns="45000"/>
-          <a:lstStyle/>
-          <a:p>
-            <a:pPr marL="216000" marR="0" lvl="0" indent="-216000" algn="just" defTabSz="914400" rtl="0" eaLnBrk="1" fontAlgn="auto" latinLnBrk="0" hangingPunct="1">
-              <a:lnSpc>
-                <a:spcPct val="120000"/>
-              </a:lnSpc>
-              <a:spcBef>
-                <a:spcPts val="0"/>
-              </a:spcBef>
-              <a:spcAft>
-                <a:spcPts val="0"/>
-              </a:spcAft>
-              <a:buClr>
-                <a:srgbClr val="808080"/>
-              </a:buClr>
-              <a:buSzPct val="45000"/>
-              <a:buFont typeface="Wingdings" charset="2"/>
-              <a:buChar char=""/>
-              <a:tabLst/>
-              <a:defRPr/>
-            </a:pPr>
-            <a:r>
-              <a:rPr kumimoji="0" lang="en-US" sz="1200" b="0" i="0" u="none" strike="noStrike" kern="1200" cap="none" spc="-1" normalizeH="0" baseline="0" noProof="0" dirty="0">
-                <a:ln>
-                  <a:noFill/>
-                </a:ln>
-                <a:solidFill>
-                  <a:srgbClr val="808080"/>
-                </a:solidFill>
-                <a:effectLst/>
-                <a:uLnTx/>
-                <a:uFill>
-                  <a:solidFill>
-                    <a:srgbClr val="FFFFFF"/>
-                  </a:solidFill>
-                </a:uFill>
-                <a:latin typeface="Calibri"/>
-              </a:rPr>
-              <a:t>Minutes “Meeting review” section</a:t>
-            </a:r>
-            <a:endParaRPr kumimoji="0" lang="en-US" sz="1800" b="0" i="0" u="none" strike="noStrike" kern="1200" cap="none" spc="-1" normalizeH="0" baseline="0" noProof="0" dirty="0">
-              <a:ln>
-                <a:noFill/>
-              </a:ln>
-              <a:solidFill>
-                <a:srgbClr val="000000"/>
-              </a:solidFill>
-              <a:effectLst/>
-              <a:uLnTx/>
-              <a:uFill>
-                <a:solidFill>
-                  <a:srgbClr val="FFFFFF"/>
-                </a:solidFill>
-              </a:uFill>
-              <a:latin typeface="Arial"/>
-            </a:endParaRPr>
-          </a:p>
-          <a:p>
-            <a:pPr marL="432000" marR="0" lvl="1" indent="-216000" algn="just" defTabSz="914400" rtl="0" eaLnBrk="1" fontAlgn="auto" latinLnBrk="0" hangingPunct="1">
-              <a:lnSpc>
-                <a:spcPct val="120000"/>
-              </a:lnSpc>
-              <a:spcBef>
-                <a:spcPts val="0"/>
-              </a:spcBef>
-              <a:spcAft>
-                <a:spcPts val="0"/>
-              </a:spcAft>
-              <a:buClr>
-                <a:srgbClr val="000000"/>
-              </a:buClr>
-              <a:buSzPct val="45000"/>
-              <a:buFont typeface="Wingdings" charset="2"/>
-              <a:buChar char=""/>
-              <a:tabLst/>
-              <a:defRPr/>
-            </a:pPr>
-            <a:r>
-              <a:rPr kumimoji="0" lang="en-US" sz="1200" b="0" i="0" u="none" strike="noStrike" kern="1200" cap="none" spc="-1" normalizeH="0" baseline="0" noProof="0" dirty="0">
-                <a:ln>
-                  <a:noFill/>
-                </a:ln>
-                <a:solidFill>
-                  <a:srgbClr val="808080"/>
-                </a:solidFill>
-                <a:effectLst/>
-                <a:uLnTx/>
-                <a:uFill>
-                  <a:solidFill>
-                    <a:srgbClr val="FFFFFF"/>
-                  </a:solidFill>
-                </a:uFill>
-                <a:latin typeface="Calibri"/>
-              </a:rPr>
-              <a:t>Recurring: focus</a:t>
-            </a:r>
-            <a:endParaRPr kumimoji="0" lang="en-US" sz="1800" b="0" i="0" u="none" strike="noStrike" kern="1200" cap="none" spc="-1" normalizeH="0" baseline="0" noProof="0" dirty="0">
-              <a:ln>
-                <a:noFill/>
-              </a:ln>
-              <a:solidFill>
-                <a:srgbClr val="000000"/>
-              </a:solidFill>
-              <a:effectLst/>
-              <a:uLnTx/>
-              <a:uFill>
-                <a:solidFill>
-                  <a:srgbClr val="FFFFFF"/>
-                </a:solidFill>
-              </a:uFill>
-              <a:latin typeface="Arial"/>
-            </a:endParaRPr>
-          </a:p>
-          <a:p>
-            <a:pPr marL="216000" marR="0" lvl="0" indent="-216000" algn="l" defTabSz="914400" rtl="0" eaLnBrk="1" fontAlgn="auto" latinLnBrk="0" hangingPunct="1">
-              <a:lnSpc>
-                <a:spcPct val="120000"/>
-              </a:lnSpc>
-              <a:spcBef>
-                <a:spcPts val="0"/>
-              </a:spcBef>
-              <a:spcAft>
-                <a:spcPts val="0"/>
-              </a:spcAft>
-              <a:buClr>
-                <a:srgbClr val="808080"/>
-              </a:buClr>
-              <a:buSzPct val="45000"/>
-              <a:buFont typeface="Wingdings" charset="2"/>
-              <a:buChar char=""/>
-              <a:tabLst/>
-              <a:defRPr/>
-            </a:pPr>
-            <a:r>
-              <a:rPr kumimoji="0" lang="en-US" sz="1200" b="0" i="0" u="none" strike="noStrike" kern="1200" cap="none" spc="-1" normalizeH="0" baseline="0" noProof="0" dirty="0">
-                <a:ln>
-                  <a:noFill/>
-                </a:ln>
-                <a:solidFill>
-                  <a:srgbClr val="808080"/>
-                </a:solidFill>
-                <a:effectLst/>
-                <a:uLnTx/>
-                <a:uFill>
-                  <a:solidFill>
-                    <a:srgbClr val="FFFFFF"/>
-                  </a:solidFill>
-                </a:uFill>
-                <a:latin typeface="Calibri"/>
-              </a:rPr>
-              <a:t>Meeting discussion transition:
-wide → narrow</a:t>
-            </a:r>
-            <a:endParaRPr kumimoji="0" lang="en-US" sz="1800" b="0" i="0" u="none" strike="noStrike" kern="1200" cap="none" spc="-1" normalizeH="0" baseline="0" noProof="0" dirty="0">
-              <a:ln>
-                <a:noFill/>
-              </a:ln>
-              <a:solidFill>
-                <a:srgbClr val="000000"/>
-              </a:solidFill>
-              <a:effectLst/>
-              <a:uLnTx/>
-              <a:uFill>
-                <a:solidFill>
-                  <a:srgbClr val="FFFFFF"/>
-                </a:solidFill>
-              </a:uFill>
-              <a:latin typeface="Arial"/>
-            </a:endParaRPr>
-          </a:p>
-          <a:p>
-            <a:pPr marL="216000" marR="0" lvl="0" indent="-216000" algn="l" defTabSz="914400" rtl="0" eaLnBrk="1" fontAlgn="auto" latinLnBrk="0" hangingPunct="1">
-              <a:lnSpc>
-                <a:spcPct val="120000"/>
-              </a:lnSpc>
-              <a:spcBef>
-                <a:spcPts val="0"/>
-              </a:spcBef>
-              <a:spcAft>
-                <a:spcPts val="0"/>
-              </a:spcAft>
-              <a:buClr>
-                <a:srgbClr val="808080"/>
-              </a:buClr>
-              <a:buSzPct val="45000"/>
-              <a:buFont typeface="Wingdings" charset="2"/>
-              <a:buChar char=""/>
-              <a:tabLst/>
-              <a:defRPr/>
-            </a:pPr>
-            <a:r>
-              <a:rPr kumimoji="0" lang="en-US" sz="1200" b="0" i="0" u="none" strike="noStrike" kern="1200" cap="none" spc="-1" normalizeH="0" baseline="0" noProof="0" dirty="0">
-                <a:ln>
-                  <a:noFill/>
-                </a:ln>
-                <a:solidFill>
-                  <a:srgbClr val="808080"/>
-                </a:solidFill>
-                <a:effectLst/>
-                <a:uLnTx/>
-                <a:uFill>
-                  <a:solidFill>
-                    <a:srgbClr val="FFFFFF"/>
-                  </a:solidFill>
-                </a:uFill>
-                <a:latin typeface="Calibri"/>
-              </a:rPr>
-              <a:t>Deliverables: abstract → concrete</a:t>
-            </a:r>
-            <a:endParaRPr kumimoji="0" lang="en-US" sz="1800" b="0" i="0" u="none" strike="noStrike" kern="1200" cap="none" spc="-1" normalizeH="0" baseline="0" noProof="0" dirty="0">
-              <a:ln>
-                <a:noFill/>
-              </a:ln>
-              <a:solidFill>
-                <a:srgbClr val="000000"/>
-              </a:solidFill>
-              <a:effectLst/>
-              <a:uLnTx/>
-              <a:uFill>
-                <a:solidFill>
-                  <a:srgbClr val="FFFFFF"/>
-                </a:solidFill>
-              </a:uFill>
-              <a:latin typeface="Arial"/>
-            </a:endParaRPr>
-          </a:p>
-        </p:txBody>
-      </p:sp>
-      <p:sp>
-        <p:nvSpPr>
-          <p:cNvPr id="302" name="CustomShape 12"/>
-          <p:cNvSpPr/>
-          <p:nvPr/>
-        </p:nvSpPr>
-        <p:spPr>
-          <a:xfrm>
-            <a:off x="4669920" y="3291840"/>
-            <a:ext cx="4519080" cy="474480"/>
-          </a:xfrm>
-          <a:prstGeom prst="rect">
-            <a:avLst/>
-          </a:prstGeom>
-          <a:noFill/>
-          <a:ln>
-            <a:noFill/>
-          </a:ln>
-        </p:spPr>
-        <p:style>
-          <a:lnRef idx="0">
-            <a:scrgbClr r="0" g="0" b="0"/>
-          </a:lnRef>
-          <a:fillRef idx="0">
-            <a:scrgbClr r="0" g="0" b="0"/>
-          </a:fillRef>
-          <a:effectRef idx="0">
-            <a:scrgbClr r="0" g="0" b="0"/>
-          </a:effectRef>
-          <a:fontRef idx="minor"/>
-        </p:style>
-        <p:txBody>
-          <a:bodyPr lIns="90000" tIns="45000" rIns="90000" bIns="45000" anchor="ctr"/>
-          <a:lstStyle/>
-          <a:p>
-            <a:pPr marL="0" marR="0" lvl="0" indent="0" algn="l" defTabSz="914400" rtl="0" eaLnBrk="1" fontAlgn="auto" latinLnBrk="0" hangingPunct="1">
-              <a:lnSpc>
-                <a:spcPts val="2032"/>
-              </a:lnSpc>
-              <a:spcBef>
-                <a:spcPts val="0"/>
-              </a:spcBef>
-              <a:spcAft>
-                <a:spcPts val="0"/>
-              </a:spcAft>
-              <a:buClrTx/>
-              <a:buSzTx/>
-              <a:buFontTx/>
-              <a:buNone/>
-              <a:tabLst/>
-              <a:defRPr/>
-            </a:pPr>
-            <a:r>
-              <a:rPr kumimoji="0" lang="en-US" sz="1600" b="1" i="0" u="none" strike="noStrike" kern="1200" cap="none" spc="-1" normalizeH="0" baseline="0" noProof="0">
-                <a:ln>
-                  <a:noFill/>
-                </a:ln>
-                <a:solidFill>
-                  <a:srgbClr val="404040"/>
-                </a:solidFill>
-                <a:effectLst/>
-                <a:uLnTx/>
-                <a:uFill>
-                  <a:solidFill>
-                    <a:srgbClr val="FFFFFF"/>
-                  </a:solidFill>
-                </a:uFill>
-                <a:latin typeface="Rockwell"/>
-              </a:rPr>
-              <a:t>In conclusion:</a:t>
-            </a:r>
-            <a:endParaRPr kumimoji="0" lang="en-US" sz="1800" b="0" i="0" u="none" strike="noStrike" kern="1200" cap="none" spc="-1" normalizeH="0" baseline="0" noProof="0">
-              <a:ln>
-                <a:noFill/>
-              </a:ln>
-              <a:solidFill>
-                <a:srgbClr val="000000"/>
-              </a:solidFill>
-              <a:effectLst/>
-              <a:uLnTx/>
-              <a:uFill>
-                <a:solidFill>
-                  <a:srgbClr val="FFFFFF"/>
-                </a:solidFill>
-              </a:uFill>
-              <a:latin typeface="Arial"/>
-            </a:endParaRPr>
-          </a:p>
-        </p:txBody>
-      </p:sp>
-      <p:sp>
-        <p:nvSpPr>
-          <p:cNvPr id="303" name="CustomShape 13"/>
-          <p:cNvSpPr/>
-          <p:nvPr/>
-        </p:nvSpPr>
-        <p:spPr>
-          <a:xfrm>
-            <a:off x="4663440" y="3972960"/>
-            <a:ext cx="3553920" cy="1512360"/>
-          </a:xfrm>
-          <a:prstGeom prst="rect">
-            <a:avLst/>
-          </a:prstGeom>
-          <a:noFill/>
-          <a:ln>
-            <a:noFill/>
-          </a:ln>
-        </p:spPr>
-        <p:style>
-          <a:lnRef idx="0">
-            <a:scrgbClr r="0" g="0" b="0"/>
-          </a:lnRef>
-          <a:fillRef idx="0">
-            <a:scrgbClr r="0" g="0" b="0"/>
-          </a:fillRef>
-          <a:effectRef idx="0">
-            <a:scrgbClr r="0" g="0" b="0"/>
-          </a:effectRef>
-          <a:fontRef idx="minor"/>
-        </p:style>
-        <p:txBody>
-          <a:bodyPr lIns="90000" tIns="45000" rIns="90000" bIns="45000"/>
-          <a:lstStyle/>
-          <a:p>
-            <a:pPr marL="216000" marR="0" lvl="0" indent="-216000" algn="l" defTabSz="914400" rtl="0" eaLnBrk="1" fontAlgn="auto" latinLnBrk="0" hangingPunct="1">
-              <a:lnSpc>
-                <a:spcPct val="120000"/>
-              </a:lnSpc>
-              <a:spcBef>
-                <a:spcPts val="0"/>
-              </a:spcBef>
-              <a:spcAft>
-                <a:spcPts val="0"/>
-              </a:spcAft>
-              <a:buClr>
-                <a:srgbClr val="808080"/>
-              </a:buClr>
-              <a:buSzPct val="45000"/>
-              <a:buFont typeface="Wingdings" charset="2"/>
-              <a:buChar char=""/>
-              <a:tabLst/>
-              <a:defRPr/>
-            </a:pPr>
-            <a:r>
-              <a:rPr kumimoji="0" lang="en-US" sz="1200" b="0" i="0" u="none" strike="noStrike" kern="1200" cap="none" spc="-1" normalizeH="0" baseline="0" noProof="0">
-                <a:ln>
-                  <a:noFill/>
-                </a:ln>
-                <a:solidFill>
-                  <a:srgbClr val="808080"/>
-                </a:solidFill>
-                <a:effectLst/>
-                <a:uLnTx/>
-                <a:uFill>
-                  <a:solidFill>
-                    <a:srgbClr val="FFFFFF"/>
-                  </a:solidFill>
-                </a:uFill>
-                <a:latin typeface="Calibri"/>
-              </a:rPr>
-              <a:t>Group has largely been experimenting</a:t>
-            </a:r>
-            <a:endParaRPr kumimoji="0" lang="en-US" sz="1800" b="0" i="0" u="none" strike="noStrike" kern="1200" cap="none" spc="-1" normalizeH="0" baseline="0" noProof="0">
-              <a:ln>
-                <a:noFill/>
-              </a:ln>
-              <a:solidFill>
-                <a:srgbClr val="000000"/>
-              </a:solidFill>
-              <a:effectLst/>
-              <a:uLnTx/>
-              <a:uFill>
-                <a:solidFill>
-                  <a:srgbClr val="FFFFFF"/>
-                </a:solidFill>
-              </a:uFill>
-              <a:latin typeface="Arial"/>
-            </a:endParaRPr>
-          </a:p>
-          <a:p>
-            <a:pPr marL="216000" marR="0" lvl="0" indent="-216000" algn="l" defTabSz="914400" rtl="0" eaLnBrk="1" fontAlgn="auto" latinLnBrk="0" hangingPunct="1">
-              <a:lnSpc>
-                <a:spcPct val="120000"/>
-              </a:lnSpc>
-              <a:spcBef>
-                <a:spcPts val="0"/>
-              </a:spcBef>
-              <a:spcAft>
-                <a:spcPts val="0"/>
-              </a:spcAft>
-              <a:buClr>
-                <a:srgbClr val="808080"/>
-              </a:buClr>
-              <a:buSzPct val="45000"/>
-              <a:buFont typeface="Wingdings" charset="2"/>
-              <a:buChar char=""/>
-              <a:tabLst/>
-              <a:defRPr/>
-            </a:pPr>
-            <a:r>
-              <a:rPr kumimoji="0" lang="en-US" sz="1200" b="0" i="0" u="none" strike="noStrike" kern="1200" cap="none" spc="-1" normalizeH="0" baseline="0" noProof="0">
-                <a:ln>
-                  <a:noFill/>
-                </a:ln>
-                <a:solidFill>
-                  <a:srgbClr val="808080"/>
-                </a:solidFill>
-                <a:effectLst/>
-                <a:uLnTx/>
-                <a:uFill>
-                  <a:solidFill>
-                    <a:srgbClr val="FFFFFF"/>
-                  </a:solidFill>
-                </a:uFill>
-                <a:latin typeface="Calibri"/>
-              </a:rPr>
-              <a:t>Process has changed a lot in a short space of time</a:t>
-            </a:r>
-            <a:endParaRPr kumimoji="0" lang="en-US" sz="1800" b="0" i="0" u="none" strike="noStrike" kern="1200" cap="none" spc="-1" normalizeH="0" baseline="0" noProof="0">
-              <a:ln>
-                <a:noFill/>
-              </a:ln>
-              <a:solidFill>
-                <a:srgbClr val="000000"/>
-              </a:solidFill>
-              <a:effectLst/>
-              <a:uLnTx/>
-              <a:uFill>
-                <a:solidFill>
-                  <a:srgbClr val="FFFFFF"/>
-                </a:solidFill>
-              </a:uFill>
-              <a:latin typeface="Arial"/>
-            </a:endParaRPr>
-          </a:p>
-          <a:p>
-            <a:pPr marL="216000" marR="0" lvl="0" indent="-216000" algn="l" defTabSz="914400" rtl="0" eaLnBrk="1" fontAlgn="auto" latinLnBrk="0" hangingPunct="1">
-              <a:lnSpc>
-                <a:spcPct val="120000"/>
-              </a:lnSpc>
-              <a:spcBef>
-                <a:spcPts val="0"/>
-              </a:spcBef>
-              <a:spcAft>
-                <a:spcPts val="0"/>
-              </a:spcAft>
-              <a:buClr>
-                <a:srgbClr val="808080"/>
-              </a:buClr>
-              <a:buSzPct val="45000"/>
-              <a:buFont typeface="Wingdings" charset="2"/>
-              <a:buChar char=""/>
-              <a:tabLst/>
-              <a:defRPr/>
-            </a:pPr>
-            <a:r>
-              <a:rPr kumimoji="0" lang="en-US" sz="1200" b="1" i="0" u="none" strike="noStrike" kern="1200" cap="none" spc="-1" normalizeH="0" baseline="0" noProof="0">
-                <a:ln>
-                  <a:noFill/>
-                </a:ln>
-                <a:solidFill>
-                  <a:srgbClr val="808080"/>
-                </a:solidFill>
-                <a:effectLst/>
-                <a:uLnTx/>
-                <a:uFill>
-                  <a:solidFill>
-                    <a:srgbClr val="FFFFFF"/>
-                  </a:solidFill>
-                </a:uFill>
-                <a:latin typeface="Calibri"/>
-              </a:rPr>
-              <a:t>This is a starting point</a:t>
-            </a:r>
-            <a:endParaRPr kumimoji="0" lang="en-US" sz="1800" b="0" i="0" u="none" strike="noStrike" kern="1200" cap="none" spc="-1" normalizeH="0" baseline="0" noProof="0">
-              <a:ln>
-                <a:noFill/>
-              </a:ln>
-              <a:solidFill>
-                <a:srgbClr val="000000"/>
-              </a:solidFill>
-              <a:effectLst/>
-              <a:uLnTx/>
-              <a:uFill>
-                <a:solidFill>
-                  <a:srgbClr val="FFFFFF"/>
-                </a:solidFill>
-              </a:uFill>
-              <a:latin typeface="Arial"/>
-            </a:endParaRPr>
-          </a:p>
-        </p:txBody>
-      </p:sp>
     </p:spTree>
     <p:extLst>
       <p:ext uri="{BB962C8B-B14F-4D97-AF65-F5344CB8AC3E}">

</xml_diff>